<commit_message>
add reference to genome builds discussion
</commit_message>
<xml_diff>
--- a/assets/lectures/cbw/2020/mini/RNASeq_MiniLecture_02_03_SAM_BAM_BED.pptx
+++ b/assets/lectures/cbw/2020/mini/RNASeq_MiniLecture_02_03_SAM_BAM_BED.pptx
@@ -215,7 +215,7 @@
           <a:p>
             <a:fld id="{3F074802-55CA-9B40-9191-B744CF71FA91}" type="datetimeFigureOut">
               <a:rPr lang="en-US" smtClean="0"/>
-              <a:t>6/15/20</a:t>
+              <a:t>6/19/20</a:t>
             </a:fld>
             <a:endParaRPr lang="en-US"/>
           </a:p>
@@ -3784,14 +3784,14 @@
           </a:ln>
           <a:extLst>
             <a:ext uri="{909E8E84-426E-40dd-AFC4-6F175D3DCCD1}">
-              <a14:hiddenFill xmlns="" xmlns:a14="http://schemas.microsoft.com/office/drawing/2010/main">
+              <a14:hiddenFill xmlns:a14="http://schemas.microsoft.com/office/drawing/2010/main" xmlns="">
                 <a:solidFill>
                   <a:srgbClr val="FFFFFF"/>
                 </a:solidFill>
               </a14:hiddenFill>
             </a:ext>
             <a:ext uri="{91240B29-F687-4f45-9708-019B960494DF}">
-              <a14:hiddenLine xmlns="" xmlns:a14="http://schemas.microsoft.com/office/drawing/2010/main" w="9525">
+              <a14:hiddenLine xmlns:a14="http://schemas.microsoft.com/office/drawing/2010/main" xmlns="" w="9525">
                 <a:solidFill>
                   <a:srgbClr val="000000"/>
                 </a:solidFill>
@@ -9542,6 +9542,50 @@
           </a:p>
         </p:txBody>
       </p:sp>
+      <p:sp>
+        <p:nvSpPr>
+          <p:cNvPr id="3" name="TextBox 2">
+            <a:extLst>
+              <a:ext uri="{FF2B5EF4-FFF2-40B4-BE49-F238E27FC236}">
+                <a16:creationId xmlns:a16="http://schemas.microsoft.com/office/drawing/2014/main" id="{397C60DD-C38F-0B41-A1F0-023D0E26699D}"/>
+              </a:ext>
+            </a:extLst>
+          </p:cNvPr>
+          <p:cNvSpPr txBox="1"/>
+          <p:nvPr/>
+        </p:nvSpPr>
+        <p:spPr>
+          <a:xfrm>
+            <a:off x="500065" y="5203604"/>
+            <a:ext cx="9525813" cy="646331"/>
+          </a:xfrm>
+          <a:prstGeom prst="rect">
+            <a:avLst/>
+          </a:prstGeom>
+          <a:noFill/>
+        </p:spPr>
+        <p:txBody>
+          <a:bodyPr wrap="none" rtlCol="0">
+            <a:spAutoFit/>
+          </a:bodyPr>
+          <a:lstStyle/>
+          <a:p>
+            <a:r>
+              <a:rPr lang="en-US" dirty="0"/>
+              <a:t>For a detailed discussion of various human reference genome flavors refer here:</a:t>
+            </a:r>
+          </a:p>
+          <a:p>
+            <a:r>
+              <a:rPr lang="en-US" dirty="0">
+                <a:hlinkClick r:id="rId3"/>
+              </a:rPr>
+              <a:t>https://pmbio.org/module-02-inputs/0002/02/01/Reference_Genome/</a:t>
+            </a:r>
+            <a:endParaRPr lang="en-US" dirty="0"/>
+          </a:p>
+        </p:txBody>
+      </p:sp>
     </p:spTree>
     <p:extLst>
       <p:ext uri="{BB962C8B-B14F-4D97-AF65-F5344CB8AC3E}">
@@ -10540,14 +10584,14 @@
           </a:ln>
           <a:extLst>
             <a:ext uri="{909E8E84-426E-40dd-AFC4-6F175D3DCCD1}">
-              <a14:hiddenFill xmlns:a14="http://schemas.microsoft.com/office/drawing/2010/main" xmlns="">
+              <a14:hiddenFill xmlns="" xmlns:a14="http://schemas.microsoft.com/office/drawing/2010/main">
                 <a:solidFill>
                   <a:srgbClr val="FFFFFF"/>
                 </a:solidFill>
               </a14:hiddenFill>
             </a:ext>
             <a:ext uri="{91240B29-F687-4f45-9708-019B960494DF}">
-              <a14:hiddenLine xmlns:a14="http://schemas.microsoft.com/office/drawing/2010/main" xmlns="" w="9525">
+              <a14:hiddenLine xmlns="" xmlns:a14="http://schemas.microsoft.com/office/drawing/2010/main" w="9525">
                 <a:solidFill>
                   <a:srgbClr val="000000"/>
                 </a:solidFill>
@@ -10721,14 +10765,14 @@
           </a:ln>
           <a:extLst>
             <a:ext uri="{909E8E84-426E-40dd-AFC4-6F175D3DCCD1}">
-              <a14:hiddenFill xmlns="" xmlns:a14="http://schemas.microsoft.com/office/drawing/2010/main">
+              <a14:hiddenFill xmlns:a14="http://schemas.microsoft.com/office/drawing/2010/main" xmlns="">
                 <a:solidFill>
                   <a:srgbClr val="FFFFFF"/>
                 </a:solidFill>
               </a14:hiddenFill>
             </a:ext>
             <a:ext uri="{91240B29-F687-4f45-9708-019B960494DF}">
-              <a14:hiddenLine xmlns="" xmlns:a14="http://schemas.microsoft.com/office/drawing/2010/main" w="9525">
+              <a14:hiddenLine xmlns:a14="http://schemas.microsoft.com/office/drawing/2010/main" xmlns="" w="9525">
                 <a:solidFill>
                   <a:srgbClr val="000000"/>
                 </a:solidFill>
@@ -10762,14 +10806,14 @@
           </a:ln>
           <a:extLst>
             <a:ext uri="{909E8E84-426E-40dd-AFC4-6F175D3DCCD1}">
-              <a14:hiddenFill xmlns="" xmlns:a14="http://schemas.microsoft.com/office/drawing/2010/main">
+              <a14:hiddenFill xmlns:a14="http://schemas.microsoft.com/office/drawing/2010/main" xmlns="">
                 <a:solidFill>
                   <a:srgbClr val="FFFFFF"/>
                 </a:solidFill>
               </a14:hiddenFill>
             </a:ext>
             <a:ext uri="{91240B29-F687-4f45-9708-019B960494DF}">
-              <a14:hiddenLine xmlns="" xmlns:a14="http://schemas.microsoft.com/office/drawing/2010/main" w="9525">
+              <a14:hiddenLine xmlns:a14="http://schemas.microsoft.com/office/drawing/2010/main" xmlns="" w="9525">
                 <a:solidFill>
                   <a:srgbClr val="000000"/>
                 </a:solidFill>
@@ -10923,14 +10967,14 @@
           </a:ln>
           <a:extLst>
             <a:ext uri="{909E8E84-426E-40dd-AFC4-6F175D3DCCD1}">
-              <a14:hiddenFill xmlns="" xmlns:a14="http://schemas.microsoft.com/office/drawing/2010/main">
+              <a14:hiddenFill xmlns:a14="http://schemas.microsoft.com/office/drawing/2010/main" xmlns="">
                 <a:solidFill>
                   <a:srgbClr val="FFFFFF"/>
                 </a:solidFill>
               </a14:hiddenFill>
             </a:ext>
             <a:ext uri="{91240B29-F687-4f45-9708-019B960494DF}">
-              <a14:hiddenLine xmlns="" xmlns:a14="http://schemas.microsoft.com/office/drawing/2010/main" w="9525">
+              <a14:hiddenLine xmlns:a14="http://schemas.microsoft.com/office/drawing/2010/main" xmlns="" w="9525">
                 <a:solidFill>
                   <a:srgbClr val="000000"/>
                 </a:solidFill>
@@ -12302,14 +12346,14 @@
           </a:ln>
           <a:extLst>
             <a:ext uri="{909E8E84-426E-40dd-AFC4-6F175D3DCCD1}">
-              <a14:hiddenFill xmlns="" xmlns:a14="http://schemas.microsoft.com/office/drawing/2010/main">
+              <a14:hiddenFill xmlns:a14="http://schemas.microsoft.com/office/drawing/2010/main" xmlns="">
                 <a:solidFill>
                   <a:srgbClr val="FFFFFF"/>
                 </a:solidFill>
               </a14:hiddenFill>
             </a:ext>
             <a:ext uri="{91240B29-F687-4f45-9708-019B960494DF}">
-              <a14:hiddenLine xmlns="" xmlns:a14="http://schemas.microsoft.com/office/drawing/2010/main" w="9525">
+              <a14:hiddenLine xmlns:a14="http://schemas.microsoft.com/office/drawing/2010/main" xmlns="" w="9525">
                 <a:solidFill>
                   <a:srgbClr val="000000"/>
                 </a:solidFill>
@@ -12597,14 +12641,14 @@
           </a:ln>
           <a:extLst>
             <a:ext uri="{909E8E84-426E-40dd-AFC4-6F175D3DCCD1}">
-              <a14:hiddenFill xmlns="" xmlns:a14="http://schemas.microsoft.com/office/drawing/2010/main">
+              <a14:hiddenFill xmlns:a14="http://schemas.microsoft.com/office/drawing/2010/main" xmlns="">
                 <a:solidFill>
                   <a:srgbClr val="FFFFFF"/>
                 </a:solidFill>
               </a14:hiddenFill>
             </a:ext>
             <a:ext uri="{91240B29-F687-4f45-9708-019B960494DF}">
-              <a14:hiddenLine xmlns="" xmlns:a14="http://schemas.microsoft.com/office/drawing/2010/main" w="9525">
+              <a14:hiddenLine xmlns:a14="http://schemas.microsoft.com/office/drawing/2010/main" xmlns="" w="9525">
                 <a:solidFill>
                   <a:srgbClr val="000000"/>
                 </a:solidFill>
@@ -12970,14 +13014,14 @@
           </a:ln>
           <a:extLst>
             <a:ext uri="{909E8E84-426E-40dd-AFC4-6F175D3DCCD1}">
-              <a14:hiddenFill xmlns="" xmlns:a14="http://schemas.microsoft.com/office/drawing/2010/main">
+              <a14:hiddenFill xmlns:a14="http://schemas.microsoft.com/office/drawing/2010/main" xmlns="">
                 <a:solidFill>
                   <a:srgbClr val="FFFFFF"/>
                 </a:solidFill>
               </a14:hiddenFill>
             </a:ext>
             <a:ext uri="{91240B29-F687-4f45-9708-019B960494DF}">
-              <a14:hiddenLine xmlns="" xmlns:a14="http://schemas.microsoft.com/office/drawing/2010/main" w="9525">
+              <a14:hiddenLine xmlns:a14="http://schemas.microsoft.com/office/drawing/2010/main" xmlns="" w="9525">
                 <a:solidFill>
                   <a:srgbClr val="000000"/>
                 </a:solidFill>

</xml_diff>